<commit_message>
Versione quasi finale, manca solo la conclusione (update 28/11/2019 10:18)
</commit_message>
<xml_diff>
--- a/Presentazione.pptx
+++ b/Presentazione.pptx
@@ -144,7 +144,7 @@
 <file path=ppt/revisionInfo.xml><?xml version="1.0" encoding="utf-8"?>
 <p1510:revInfo xmlns:a="http://schemas.openxmlformats.org/drawingml/2006/main" xmlns:r="http://schemas.openxmlformats.org/officeDocument/2006/relationships" xmlns:p1510="http://schemas.microsoft.com/office/powerpoint/2015/10/main">
   <p1510:revLst>
-    <p1510:client id="{98A304F7-BD7A-451D-86FF-B1FA8BB979E8}" v="10" dt="2019-11-28T08:33:45.461"/>
+    <p1510:client id="{98A304F7-BD7A-451D-86FF-B1FA8BB979E8}" v="22" dt="2019-11-28T09:13:32.479"/>
   </p1510:revLst>
 </p1510:revInfo>
 </file>
@@ -781,12 +781,27 @@
   <pc:docChgLst>
     <pc:chgData name="Andrei Daniel Ivan" userId="d3c4cde5a19fb9a3" providerId="LiveId" clId="{98A304F7-BD7A-451D-86FF-B1FA8BB979E8}"/>
     <pc:docChg chg="undo custSel addSld modSld">
-      <pc:chgData name="Andrei Daniel Ivan" userId="d3c4cde5a19fb9a3" providerId="LiveId" clId="{98A304F7-BD7A-451D-86FF-B1FA8BB979E8}" dt="2019-11-28T08:36:07.152" v="348" actId="20577"/>
+      <pc:chgData name="Andrei Daniel Ivan" userId="d3c4cde5a19fb9a3" providerId="LiveId" clId="{98A304F7-BD7A-451D-86FF-B1FA8BB979E8}" dt="2019-11-28T09:15:37.512" v="1985" actId="20577"/>
       <pc:docMkLst>
         <pc:docMk/>
       </pc:docMkLst>
-      <pc:sldChg chg="modSp add">
-        <pc:chgData name="Andrei Daniel Ivan" userId="d3c4cde5a19fb9a3" providerId="LiveId" clId="{98A304F7-BD7A-451D-86FF-B1FA8BB979E8}" dt="2019-11-28T08:10:47.813" v="107" actId="1076"/>
+      <pc:sldChg chg="modSp">
+        <pc:chgData name="Andrei Daniel Ivan" userId="d3c4cde5a19fb9a3" providerId="LiveId" clId="{98A304F7-BD7A-451D-86FF-B1FA8BB979E8}" dt="2019-11-28T09:02:21.392" v="1554" actId="207"/>
+        <pc:sldMkLst>
+          <pc:docMk/>
+          <pc:sldMk cId="148092493" sldId="264"/>
+        </pc:sldMkLst>
+        <pc:spChg chg="mod">
+          <ac:chgData name="Andrei Daniel Ivan" userId="d3c4cde5a19fb9a3" providerId="LiveId" clId="{98A304F7-BD7A-451D-86FF-B1FA8BB979E8}" dt="2019-11-28T09:02:21.392" v="1554" actId="207"/>
+          <ac:spMkLst>
+            <pc:docMk/>
+            <pc:sldMk cId="148092493" sldId="264"/>
+            <ac:spMk id="5" creationId="{575E9FB5-702A-42D6-A2EB-DC69E86329E8}"/>
+          </ac:spMkLst>
+        </pc:spChg>
+      </pc:sldChg>
+      <pc:sldChg chg="addSp modSp add">
+        <pc:chgData name="Andrei Daniel Ivan" userId="d3c4cde5a19fb9a3" providerId="LiveId" clId="{98A304F7-BD7A-451D-86FF-B1FA8BB979E8}" dt="2019-11-28T09:10:01.127" v="1713" actId="14100"/>
         <pc:sldMkLst>
           <pc:docMk/>
           <pc:sldMk cId="2021459913" sldId="267"/>
@@ -799,6 +814,14 @@
             <ac:spMk id="2" creationId="{F1DDE7A4-1A5F-4F0D-B842-7798EDC6EDA8}"/>
           </ac:spMkLst>
         </pc:spChg>
+        <pc:spChg chg="add mod">
+          <ac:chgData name="Andrei Daniel Ivan" userId="d3c4cde5a19fb9a3" providerId="LiveId" clId="{98A304F7-BD7A-451D-86FF-B1FA8BB979E8}" dt="2019-11-28T09:10:01.127" v="1713" actId="14100"/>
+          <ac:spMkLst>
+            <pc:docMk/>
+            <pc:sldMk cId="2021459913" sldId="267"/>
+            <ac:spMk id="4" creationId="{E09F503C-0BDF-41C2-9211-51F5C54560C5}"/>
+          </ac:spMkLst>
+        </pc:spChg>
         <pc:spChg chg="mod">
           <ac:chgData name="Andrei Daniel Ivan" userId="d3c4cde5a19fb9a3" providerId="LiveId" clId="{98A304F7-BD7A-451D-86FF-B1FA8BB979E8}" dt="2019-11-28T08:10:47.813" v="107" actId="1076"/>
           <ac:spMkLst>
@@ -808,8 +831,8 @@
           </ac:spMkLst>
         </pc:spChg>
       </pc:sldChg>
-      <pc:sldChg chg="modSp add">
-        <pc:chgData name="Andrei Daniel Ivan" userId="d3c4cde5a19fb9a3" providerId="LiveId" clId="{98A304F7-BD7A-451D-86FF-B1FA8BB979E8}" dt="2019-11-28T08:23:02.656" v="200" actId="20577"/>
+      <pc:sldChg chg="addSp modSp add">
+        <pc:chgData name="Andrei Daniel Ivan" userId="d3c4cde5a19fb9a3" providerId="LiveId" clId="{98A304F7-BD7A-451D-86FF-B1FA8BB979E8}" dt="2019-11-28T09:15:37.512" v="1985" actId="20577"/>
         <pc:sldMkLst>
           <pc:docMk/>
           <pc:sldMk cId="3131005690" sldId="268"/>
@@ -830,9 +853,17 @@
             <ac:spMk id="5" creationId="{575E9FB5-702A-42D6-A2EB-DC69E86329E8}"/>
           </ac:spMkLst>
         </pc:spChg>
+        <pc:spChg chg="add mod">
+          <ac:chgData name="Andrei Daniel Ivan" userId="d3c4cde5a19fb9a3" providerId="LiveId" clId="{98A304F7-BD7A-451D-86FF-B1FA8BB979E8}" dt="2019-11-28T09:15:37.512" v="1985" actId="20577"/>
+          <ac:spMkLst>
+            <pc:docMk/>
+            <pc:sldMk cId="3131005690" sldId="268"/>
+            <ac:spMk id="6" creationId="{1155A3B7-113E-424E-9834-986E27ED6555}"/>
+          </ac:spMkLst>
+        </pc:spChg>
       </pc:sldChg>
-      <pc:sldChg chg="modSp add">
-        <pc:chgData name="Andrei Daniel Ivan" userId="d3c4cde5a19fb9a3" providerId="LiveId" clId="{98A304F7-BD7A-451D-86FF-B1FA8BB979E8}" dt="2019-11-28T08:25:44.787" v="252" actId="20577"/>
+      <pc:sldChg chg="addSp modSp add">
+        <pc:chgData name="Andrei Daniel Ivan" userId="d3c4cde5a19fb9a3" providerId="LiveId" clId="{98A304F7-BD7A-451D-86FF-B1FA8BB979E8}" dt="2019-11-28T09:11:16.839" v="1785" actId="14100"/>
         <pc:sldMkLst>
           <pc:docMk/>
           <pc:sldMk cId="1620050625" sldId="269"/>
@@ -853,9 +884,17 @@
             <ac:spMk id="5" creationId="{575E9FB5-702A-42D6-A2EB-DC69E86329E8}"/>
           </ac:spMkLst>
         </pc:spChg>
+        <pc:spChg chg="add mod">
+          <ac:chgData name="Andrei Daniel Ivan" userId="d3c4cde5a19fb9a3" providerId="LiveId" clId="{98A304F7-BD7A-451D-86FF-B1FA8BB979E8}" dt="2019-11-28T09:11:16.839" v="1785" actId="14100"/>
+          <ac:spMkLst>
+            <pc:docMk/>
+            <pc:sldMk cId="1620050625" sldId="269"/>
+            <ac:spMk id="6" creationId="{8D5572F9-C690-4483-BA2D-E5DEA52F11E4}"/>
+          </ac:spMkLst>
+        </pc:spChg>
       </pc:sldChg>
-      <pc:sldChg chg="modSp add">
-        <pc:chgData name="Andrei Daniel Ivan" userId="d3c4cde5a19fb9a3" providerId="LiveId" clId="{98A304F7-BD7A-451D-86FF-B1FA8BB979E8}" dt="2019-11-28T08:32:08.003" v="330" actId="20577"/>
+      <pc:sldChg chg="addSp modSp add">
+        <pc:chgData name="Andrei Daniel Ivan" userId="d3c4cde5a19fb9a3" providerId="LiveId" clId="{98A304F7-BD7A-451D-86FF-B1FA8BB979E8}" dt="2019-11-28T09:13:18.641" v="1883" actId="1076"/>
         <pc:sldMkLst>
           <pc:docMk/>
           <pc:sldMk cId="3456344343" sldId="270"/>
@@ -876,9 +915,17 @@
             <ac:spMk id="5" creationId="{575E9FB5-702A-42D6-A2EB-DC69E86329E8}"/>
           </ac:spMkLst>
         </pc:spChg>
+        <pc:spChg chg="add mod">
+          <ac:chgData name="Andrei Daniel Ivan" userId="d3c4cde5a19fb9a3" providerId="LiveId" clId="{98A304F7-BD7A-451D-86FF-B1FA8BB979E8}" dt="2019-11-28T09:13:18.641" v="1883" actId="1076"/>
+          <ac:spMkLst>
+            <pc:docMk/>
+            <pc:sldMk cId="3456344343" sldId="270"/>
+            <ac:spMk id="6" creationId="{99C6E743-F681-451D-971D-CB146486B754}"/>
+          </ac:spMkLst>
+        </pc:spChg>
       </pc:sldChg>
-      <pc:sldChg chg="modSp add">
-        <pc:chgData name="Andrei Daniel Ivan" userId="d3c4cde5a19fb9a3" providerId="LiveId" clId="{98A304F7-BD7A-451D-86FF-B1FA8BB979E8}" dt="2019-11-28T08:36:07.152" v="348" actId="20577"/>
+      <pc:sldChg chg="addSp modSp add">
+        <pc:chgData name="Andrei Daniel Ivan" userId="d3c4cde5a19fb9a3" providerId="LiveId" clId="{98A304F7-BD7A-451D-86FF-B1FA8BB979E8}" dt="2019-11-28T09:14:52.553" v="1984" actId="14100"/>
         <pc:sldMkLst>
           <pc:docMk/>
           <pc:sldMk cId="515671664" sldId="271"/>
@@ -892,11 +939,19 @@
           </ac:spMkLst>
         </pc:spChg>
         <pc:spChg chg="mod">
-          <ac:chgData name="Andrei Daniel Ivan" userId="d3c4cde5a19fb9a3" providerId="LiveId" clId="{98A304F7-BD7A-451D-86FF-B1FA8BB979E8}" dt="2019-11-28T08:36:07.152" v="348" actId="20577"/>
+          <ac:chgData name="Andrei Daniel Ivan" userId="d3c4cde5a19fb9a3" providerId="LiveId" clId="{98A304F7-BD7A-451D-86FF-B1FA8BB979E8}" dt="2019-11-28T09:13:58.853" v="1886" actId="20577"/>
           <ac:spMkLst>
             <pc:docMk/>
             <pc:sldMk cId="515671664" sldId="271"/>
             <ac:spMk id="5" creationId="{575E9FB5-702A-42D6-A2EB-DC69E86329E8}"/>
+          </ac:spMkLst>
+        </pc:spChg>
+        <pc:spChg chg="add mod">
+          <ac:chgData name="Andrei Daniel Ivan" userId="d3c4cde5a19fb9a3" providerId="LiveId" clId="{98A304F7-BD7A-451D-86FF-B1FA8BB979E8}" dt="2019-11-28T09:14:52.553" v="1984" actId="14100"/>
+          <ac:spMkLst>
+            <pc:docMk/>
+            <pc:sldMk cId="515671664" sldId="271"/>
+            <ac:spMk id="6" creationId="{4D6511D9-5CE1-4CC2-ACCC-C7CBD690ED6D}"/>
           </ac:spMkLst>
         </pc:spChg>
       </pc:sldChg>
@@ -5058,7 +5113,7 @@
         <p:spPr>
           <a:xfrm>
             <a:off x="882212" y="1003301"/>
-            <a:ext cx="10427575" cy="461088"/>
+            <a:ext cx="10427575" cy="3785075"/>
           </a:xfrm>
           <a:prstGeom prst="rect">
             <a:avLst/>
@@ -5088,19 +5143,105 @@
                 <a:ea typeface="Calibri" panose="020F0502020204030204" pitchFamily="34" charset="0"/>
                 <a:cs typeface="Times New Roman" panose="02020603050405020304" pitchFamily="18" charset="0"/>
               </a:rPr>
-              <a:t>To be </a:t>
+              <a:t>Il Registro Remoto implementa i metodi </a:t>
             </a:r>
             <a:r>
               <a:rPr lang="it-IT" dirty="0" err="1">
                 <a:solidFill>
-                  <a:schemeClr val="bg1"/>
+                  <a:srgbClr val="00B0F0"/>
                 </a:solidFill>
                 <a:latin typeface="Avenir Next LT Pro Light" panose="020B0304020202020204" pitchFamily="34" charset="0"/>
                 <a:ea typeface="Calibri" panose="020F0502020204030204" pitchFamily="34" charset="0"/>
                 <a:cs typeface="Times New Roman" panose="02020603050405020304" pitchFamily="18" charset="0"/>
               </a:rPr>
-              <a:t>defined</a:t>
-            </a:r>
+              <a:t>associaTag</a:t>
+            </a:r>
+            <a:r>
+              <a:rPr lang="it-IT" dirty="0">
+                <a:solidFill>
+                  <a:schemeClr val="bg1"/>
+                </a:solidFill>
+                <a:latin typeface="Avenir Next LT Pro Light" panose="020B0304020202020204" pitchFamily="34" charset="0"/>
+                <a:ea typeface="Calibri" panose="020F0502020204030204" pitchFamily="34" charset="0"/>
+                <a:cs typeface="Times New Roman" panose="02020603050405020304" pitchFamily="18" charset="0"/>
+              </a:rPr>
+              <a:t> e </a:t>
+            </a:r>
+            <a:r>
+              <a:rPr lang="it-IT" dirty="0" err="1">
+                <a:solidFill>
+                  <a:srgbClr val="00B0F0"/>
+                </a:solidFill>
+                <a:latin typeface="Avenir Next LT Pro Light" panose="020B0304020202020204" pitchFamily="34" charset="0"/>
+                <a:ea typeface="Calibri" panose="020F0502020204030204" pitchFamily="34" charset="0"/>
+                <a:cs typeface="Times New Roman" panose="02020603050405020304" pitchFamily="18" charset="0"/>
+              </a:rPr>
+              <a:t>cercaTag</a:t>
+            </a:r>
+            <a:r>
+              <a:rPr lang="it-IT" dirty="0">
+                <a:solidFill>
+                  <a:schemeClr val="bg1"/>
+                </a:solidFill>
+                <a:latin typeface="Avenir Next LT Pro Light" panose="020B0304020202020204" pitchFamily="34" charset="0"/>
+                <a:ea typeface="Calibri" panose="020F0502020204030204" pitchFamily="34" charset="0"/>
+                <a:cs typeface="Times New Roman" panose="02020603050405020304" pitchFamily="18" charset="0"/>
+              </a:rPr>
+              <a:t> definiti in due apposite interfacce.</a:t>
+            </a:r>
+          </a:p>
+          <a:p>
+            <a:pPr algn="just">
+              <a:lnSpc>
+                <a:spcPct val="150000"/>
+              </a:lnSpc>
+              <a:spcAft>
+                <a:spcPts val="0"/>
+              </a:spcAft>
+            </a:pPr>
+            <a:r>
+              <a:rPr lang="it-IT" dirty="0">
+                <a:solidFill>
+                  <a:schemeClr val="bg1"/>
+                </a:solidFill>
+                <a:latin typeface="Avenir Next LT Pro Light" panose="020B0304020202020204" pitchFamily="34" charset="0"/>
+                <a:ea typeface="Calibri" panose="020F0502020204030204" pitchFamily="34" charset="0"/>
+                <a:cs typeface="Times New Roman" panose="02020603050405020304" pitchFamily="18" charset="0"/>
+              </a:rPr>
+              <a:t>Viene utilizzata una matrice per memorizzare le triple </a:t>
+            </a:r>
+            <a:r>
+              <a:rPr lang="it-IT" dirty="0" err="1">
+                <a:solidFill>
+                  <a:schemeClr val="bg1"/>
+                </a:solidFill>
+                <a:latin typeface="Avenir Next LT Pro Light" panose="020B0304020202020204" pitchFamily="34" charset="0"/>
+                <a:ea typeface="Calibri" panose="020F0502020204030204" pitchFamily="34" charset="0"/>
+                <a:cs typeface="Times New Roman" panose="02020603050405020304" pitchFamily="18" charset="0"/>
+              </a:rPr>
+              <a:t>nomeServizio</a:t>
+            </a:r>
+            <a:r>
+              <a:rPr lang="it-IT" dirty="0">
+                <a:solidFill>
+                  <a:schemeClr val="bg1"/>
+                </a:solidFill>
+                <a:latin typeface="Avenir Next LT Pro Light" panose="020B0304020202020204" pitchFamily="34" charset="0"/>
+                <a:ea typeface="Calibri" panose="020F0502020204030204" pitchFamily="34" charset="0"/>
+                <a:cs typeface="Times New Roman" panose="02020603050405020304" pitchFamily="18" charset="0"/>
+              </a:rPr>
+              <a:t> – locazione – tag.</a:t>
+            </a:r>
+          </a:p>
+          <a:p>
+            <a:pPr algn="just">
+              <a:lnSpc>
+                <a:spcPct val="150000"/>
+              </a:lnSpc>
+              <a:spcAft>
+                <a:spcPts val="0"/>
+              </a:spcAft>
+            </a:pPr>
             <a:endParaRPr lang="it-IT" dirty="0">
               <a:solidFill>
                 <a:schemeClr val="bg1"/>
@@ -5109,6 +5250,174 @@
               <a:ea typeface="Calibri" panose="020F0502020204030204" pitchFamily="34" charset="0"/>
               <a:cs typeface="Times New Roman" panose="02020603050405020304" pitchFamily="18" charset="0"/>
             </a:endParaRPr>
+          </a:p>
+          <a:p>
+            <a:pPr algn="just">
+              <a:lnSpc>
+                <a:spcPct val="150000"/>
+              </a:lnSpc>
+              <a:spcAft>
+                <a:spcPts val="0"/>
+              </a:spcAft>
+            </a:pPr>
+            <a:r>
+              <a:rPr lang="it-IT" dirty="0">
+                <a:solidFill>
+                  <a:schemeClr val="bg1"/>
+                </a:solidFill>
+                <a:latin typeface="Avenir Next LT Pro Light" panose="020B0304020202020204" pitchFamily="34" charset="0"/>
+                <a:ea typeface="Calibri" panose="020F0502020204030204" pitchFamily="34" charset="0"/>
+                <a:cs typeface="Times New Roman" panose="02020603050405020304" pitchFamily="18" charset="0"/>
+              </a:rPr>
+              <a:t>La </a:t>
+            </a:r>
+            <a:r>
+              <a:rPr lang="it-IT" dirty="0">
+                <a:solidFill>
+                  <a:srgbClr val="00B0F0"/>
+                </a:solidFill>
+                <a:latin typeface="Avenir Next LT Pro Light" panose="020B0304020202020204" pitchFamily="34" charset="0"/>
+                <a:ea typeface="Calibri" panose="020F0502020204030204" pitchFamily="34" charset="0"/>
+                <a:cs typeface="Times New Roman" panose="02020603050405020304" pitchFamily="18" charset="0"/>
+              </a:rPr>
+              <a:t>classe Tag</a:t>
+            </a:r>
+            <a:r>
+              <a:rPr lang="it-IT" dirty="0">
+                <a:solidFill>
+                  <a:schemeClr val="bg1"/>
+                </a:solidFill>
+                <a:latin typeface="Avenir Next LT Pro Light" panose="020B0304020202020204" pitchFamily="34" charset="0"/>
+                <a:ea typeface="Calibri" panose="020F0502020204030204" pitchFamily="34" charset="0"/>
+                <a:cs typeface="Times New Roman" panose="02020603050405020304" pitchFamily="18" charset="0"/>
+              </a:rPr>
+              <a:t> definisce tutte le categorie disponibili, e i metodi implementati nel Registro Remoto dovranno avere necessariamente uno di quei tag come parametro per completare l’operazione.</a:t>
+            </a:r>
+          </a:p>
+          <a:p>
+            <a:pPr algn="just">
+              <a:lnSpc>
+                <a:spcPct val="150000"/>
+              </a:lnSpc>
+              <a:spcAft>
+                <a:spcPts val="0"/>
+              </a:spcAft>
+            </a:pPr>
+            <a:endParaRPr lang="it-IT" dirty="0">
+              <a:solidFill>
+                <a:schemeClr val="bg1"/>
+              </a:solidFill>
+              <a:latin typeface="Avenir Next LT Pro Light" panose="020B0304020202020204" pitchFamily="34" charset="0"/>
+              <a:ea typeface="Calibri" panose="020F0502020204030204" pitchFamily="34" charset="0"/>
+              <a:cs typeface="Times New Roman" panose="02020603050405020304" pitchFamily="18" charset="0"/>
+            </a:endParaRPr>
+          </a:p>
+          <a:p>
+            <a:pPr algn="just">
+              <a:lnSpc>
+                <a:spcPct val="150000"/>
+              </a:lnSpc>
+              <a:spcAft>
+                <a:spcPts val="0"/>
+              </a:spcAft>
+            </a:pPr>
+            <a:r>
+              <a:rPr lang="it-IT" dirty="0">
+                <a:solidFill>
+                  <a:schemeClr val="bg1"/>
+                </a:solidFill>
+                <a:latin typeface="Avenir Next LT Pro Light" panose="020B0304020202020204" pitchFamily="34" charset="0"/>
+                <a:ea typeface="Calibri" panose="020F0502020204030204" pitchFamily="34" charset="0"/>
+                <a:cs typeface="Times New Roman" panose="02020603050405020304" pitchFamily="18" charset="0"/>
+              </a:rPr>
+              <a:t> L’</a:t>
+            </a:r>
+            <a:r>
+              <a:rPr lang="it-IT" dirty="0">
+                <a:solidFill>
+                  <a:srgbClr val="00B0F0"/>
+                </a:solidFill>
+                <a:latin typeface="Avenir Next LT Pro Light" panose="020B0304020202020204" pitchFamily="34" charset="0"/>
+                <a:ea typeface="Calibri" panose="020F0502020204030204" pitchFamily="34" charset="0"/>
+                <a:cs typeface="Times New Roman" panose="02020603050405020304" pitchFamily="18" charset="0"/>
+              </a:rPr>
+              <a:t>utilizzo dei Tag </a:t>
+            </a:r>
+            <a:r>
+              <a:rPr lang="it-IT" dirty="0">
+                <a:solidFill>
+                  <a:schemeClr val="bg1"/>
+                </a:solidFill>
+                <a:latin typeface="Avenir Next LT Pro Light" panose="020B0304020202020204" pitchFamily="34" charset="0"/>
+                <a:ea typeface="Calibri" panose="020F0502020204030204" pitchFamily="34" charset="0"/>
+                <a:cs typeface="Times New Roman" panose="02020603050405020304" pitchFamily="18" charset="0"/>
+              </a:rPr>
+              <a:t>da parte di Client e Server </a:t>
+            </a:r>
+            <a:r>
+              <a:rPr lang="it-IT" dirty="0">
+                <a:solidFill>
+                  <a:srgbClr val="00B0F0"/>
+                </a:solidFill>
+                <a:latin typeface="Avenir Next LT Pro Light" panose="020B0304020202020204" pitchFamily="34" charset="0"/>
+                <a:ea typeface="Calibri" panose="020F0502020204030204" pitchFamily="34" charset="0"/>
+                <a:cs typeface="Times New Roman" panose="02020603050405020304" pitchFamily="18" charset="0"/>
+              </a:rPr>
+              <a:t>è opzionale</a:t>
+            </a:r>
+            <a:r>
+              <a:rPr lang="it-IT" dirty="0">
+                <a:solidFill>
+                  <a:schemeClr val="bg1"/>
+                </a:solidFill>
+                <a:latin typeface="Avenir Next LT Pro Light" panose="020B0304020202020204" pitchFamily="34" charset="0"/>
+                <a:ea typeface="Calibri" panose="020F0502020204030204" pitchFamily="34" charset="0"/>
+                <a:cs typeface="Times New Roman" panose="02020603050405020304" pitchFamily="18" charset="0"/>
+              </a:rPr>
+              <a:t>:</a:t>
+            </a:r>
+          </a:p>
+          <a:p>
+            <a:pPr algn="just">
+              <a:lnSpc>
+                <a:spcPct val="150000"/>
+              </a:lnSpc>
+              <a:spcAft>
+                <a:spcPts val="0"/>
+              </a:spcAft>
+            </a:pPr>
+            <a:r>
+              <a:rPr lang="it-IT" dirty="0">
+                <a:solidFill>
+                  <a:schemeClr val="bg1"/>
+                </a:solidFill>
+                <a:latin typeface="Avenir Next LT Pro Light" panose="020B0304020202020204" pitchFamily="34" charset="0"/>
+                <a:ea typeface="Calibri" panose="020F0502020204030204" pitchFamily="34" charset="0"/>
+                <a:cs typeface="Times New Roman" panose="02020603050405020304" pitchFamily="18" charset="0"/>
+              </a:rPr>
+              <a:t>	- non è necessario che un Server si iscriva al Registro Remoto specificando una categoria;</a:t>
+            </a:r>
+          </a:p>
+          <a:p>
+            <a:pPr algn="just">
+              <a:lnSpc>
+                <a:spcPct val="150000"/>
+              </a:lnSpc>
+              <a:spcAft>
+                <a:spcPts val="0"/>
+              </a:spcAft>
+            </a:pPr>
+            <a:r>
+              <a:rPr lang="it-IT" dirty="0">
+                <a:solidFill>
+                  <a:schemeClr val="bg1"/>
+                </a:solidFill>
+                <a:latin typeface="Avenir Next LT Pro Light" panose="020B0304020202020204" pitchFamily="34" charset="0"/>
+                <a:ea typeface="Calibri" panose="020F0502020204030204" pitchFamily="34" charset="0"/>
+                <a:cs typeface="Times New Roman" panose="02020603050405020304" pitchFamily="18" charset="0"/>
+              </a:rPr>
+              <a:t>	- un Client può cercare sia per nome del servizio che per categoria.</a:t>
+            </a:r>
           </a:p>
         </p:txBody>
       </p:sp>
@@ -7244,6 +7553,68 @@
           </a:p>
         </p:txBody>
       </p:sp>
+      <p:sp>
+        <p:nvSpPr>
+          <p:cNvPr id="4" name="Rettangolo con angoli arrotondati 3">
+            <a:extLst>
+              <a:ext uri="{FF2B5EF4-FFF2-40B4-BE49-F238E27FC236}">
+                <a16:creationId xmlns:a16="http://schemas.microsoft.com/office/drawing/2014/main" id="{E09F503C-0BDF-41C2-9211-51F5C54560C5}"/>
+              </a:ext>
+            </a:extLst>
+          </p:cNvPr>
+          <p:cNvSpPr/>
+          <p:nvPr/>
+        </p:nvSpPr>
+        <p:spPr>
+          <a:xfrm>
+            <a:off x="8263156" y="3682767"/>
+            <a:ext cx="2390861" cy="796954"/>
+          </a:xfrm>
+          <a:prstGeom prst="roundRect">
+            <a:avLst/>
+          </a:prstGeom>
+          <a:solidFill>
+            <a:schemeClr val="accent4"/>
+          </a:solidFill>
+          <a:ln>
+            <a:solidFill>
+              <a:schemeClr val="accent4"/>
+            </a:solidFill>
+          </a:ln>
+        </p:spPr>
+        <p:style>
+          <a:lnRef idx="2">
+            <a:schemeClr val="accent1">
+              <a:shade val="50000"/>
+            </a:schemeClr>
+          </a:lnRef>
+          <a:fillRef idx="1">
+            <a:schemeClr val="accent1"/>
+          </a:fillRef>
+          <a:effectRef idx="0">
+            <a:schemeClr val="accent1"/>
+          </a:effectRef>
+          <a:fontRef idx="minor">
+            <a:schemeClr val="lt1"/>
+          </a:fontRef>
+        </p:style>
+        <p:txBody>
+          <a:bodyPr rtlCol="0" anchor="ctr"/>
+          <a:lstStyle/>
+          <a:p>
+            <a:pPr algn="just"/>
+            <a:r>
+              <a:rPr lang="it-IT" sz="1600" dirty="0">
+                <a:solidFill>
+                  <a:schemeClr val="tx1"/>
+                </a:solidFill>
+                <a:latin typeface="Avenir Next LT Pro Light" panose="020B0304020202020204" pitchFamily="34" charset="0"/>
+              </a:rPr>
+              <a:t>Il Client permette di scegliere il metodo di ricerca a cui accedere.</a:t>
+            </a:r>
+          </a:p>
+        </p:txBody>
+      </p:sp>
     </p:spTree>
     <p:extLst>
       <p:ext uri="{BB962C8B-B14F-4D97-AF65-F5344CB8AC3E}">
@@ -8420,6 +8791,68 @@
               <a:ea typeface="Calibri" panose="020F0502020204030204" pitchFamily="34" charset="0"/>
               <a:cs typeface="Times New Roman" panose="02020603050405020304" pitchFamily="18" charset="0"/>
             </a:endParaRPr>
+          </a:p>
+        </p:txBody>
+      </p:sp>
+      <p:sp>
+        <p:nvSpPr>
+          <p:cNvPr id="6" name="Rettangolo con angoli arrotondati 5">
+            <a:extLst>
+              <a:ext uri="{FF2B5EF4-FFF2-40B4-BE49-F238E27FC236}">
+                <a16:creationId xmlns:a16="http://schemas.microsoft.com/office/drawing/2014/main" id="{1155A3B7-113E-424E-9834-986E27ED6555}"/>
+              </a:ext>
+            </a:extLst>
+          </p:cNvPr>
+          <p:cNvSpPr/>
+          <p:nvPr/>
+        </p:nvSpPr>
+        <p:spPr>
+          <a:xfrm>
+            <a:off x="7226416" y="3496111"/>
+            <a:ext cx="2768367" cy="687897"/>
+          </a:xfrm>
+          <a:prstGeom prst="roundRect">
+            <a:avLst/>
+          </a:prstGeom>
+          <a:solidFill>
+            <a:schemeClr val="accent4"/>
+          </a:solidFill>
+          <a:ln>
+            <a:solidFill>
+              <a:schemeClr val="accent4"/>
+            </a:solidFill>
+          </a:ln>
+        </p:spPr>
+        <p:style>
+          <a:lnRef idx="2">
+            <a:schemeClr val="accent1">
+              <a:shade val="50000"/>
+            </a:schemeClr>
+          </a:lnRef>
+          <a:fillRef idx="1">
+            <a:schemeClr val="accent1"/>
+          </a:fillRef>
+          <a:effectRef idx="0">
+            <a:schemeClr val="accent1"/>
+          </a:effectRef>
+          <a:fontRef idx="minor">
+            <a:schemeClr val="lt1"/>
+          </a:fontRef>
+        </p:style>
+        <p:txBody>
+          <a:bodyPr rtlCol="0" anchor="ctr"/>
+          <a:lstStyle/>
+          <a:p>
+            <a:pPr algn="just"/>
+            <a:r>
+              <a:rPr lang="it-IT" sz="1600" dirty="0">
+                <a:solidFill>
+                  <a:schemeClr val="tx1"/>
+                </a:solidFill>
+                <a:latin typeface="Avenir Next LT Pro Light" panose="020B0304020202020204" pitchFamily="34" charset="0"/>
+              </a:rPr>
+              <a:t>Se il Tag è disponibile, si procede con l’associazione.</a:t>
+            </a:r>
           </a:p>
         </p:txBody>
       </p:sp>
@@ -10125,6 +10558,68 @@
           </a:p>
         </p:txBody>
       </p:sp>
+      <p:sp>
+        <p:nvSpPr>
+          <p:cNvPr id="6" name="Rettangolo con angoli arrotondati 5">
+            <a:extLst>
+              <a:ext uri="{FF2B5EF4-FFF2-40B4-BE49-F238E27FC236}">
+                <a16:creationId xmlns:a16="http://schemas.microsoft.com/office/drawing/2014/main" id="{8D5572F9-C690-4483-BA2D-E5DEA52F11E4}"/>
+              </a:ext>
+            </a:extLst>
+          </p:cNvPr>
+          <p:cNvSpPr/>
+          <p:nvPr/>
+        </p:nvSpPr>
+        <p:spPr>
+          <a:xfrm>
+            <a:off x="7125748" y="3254928"/>
+            <a:ext cx="2969703" cy="665728"/>
+          </a:xfrm>
+          <a:prstGeom prst="roundRect">
+            <a:avLst/>
+          </a:prstGeom>
+          <a:solidFill>
+            <a:schemeClr val="accent4"/>
+          </a:solidFill>
+          <a:ln>
+            <a:solidFill>
+              <a:schemeClr val="accent4"/>
+            </a:solidFill>
+          </a:ln>
+        </p:spPr>
+        <p:style>
+          <a:lnRef idx="2">
+            <a:schemeClr val="accent1">
+              <a:shade val="50000"/>
+            </a:schemeClr>
+          </a:lnRef>
+          <a:fillRef idx="1">
+            <a:schemeClr val="accent1"/>
+          </a:fillRef>
+          <a:effectRef idx="0">
+            <a:schemeClr val="accent1"/>
+          </a:effectRef>
+          <a:fontRef idx="minor">
+            <a:schemeClr val="lt1"/>
+          </a:fontRef>
+        </p:style>
+        <p:txBody>
+          <a:bodyPr rtlCol="0" anchor="ctr"/>
+          <a:lstStyle/>
+          <a:p>
+            <a:pPr algn="just"/>
+            <a:r>
+              <a:rPr lang="it-IT" sz="1600" dirty="0">
+                <a:solidFill>
+                  <a:schemeClr val="tx1"/>
+                </a:solidFill>
+                <a:latin typeface="Avenir Next LT Pro Light" panose="020B0304020202020204" pitchFamily="34" charset="0"/>
+              </a:rPr>
+              <a:t>Viene eseguita la ricerca dei nomi logici associati al Tag.</a:t>
+            </a:r>
+          </a:p>
+        </p:txBody>
+      </p:sp>
     </p:spTree>
     <p:extLst>
       <p:ext uri="{BB962C8B-B14F-4D97-AF65-F5344CB8AC3E}">
@@ -11784,6 +12279,68 @@
               <a:ea typeface="Calibri" panose="020F0502020204030204" pitchFamily="34" charset="0"/>
               <a:cs typeface="Times New Roman" panose="02020603050405020304" pitchFamily="18" charset="0"/>
             </a:endParaRPr>
+          </a:p>
+        </p:txBody>
+      </p:sp>
+      <p:sp>
+        <p:nvSpPr>
+          <p:cNvPr id="6" name="Rettangolo con angoli arrotondati 5">
+            <a:extLst>
+              <a:ext uri="{FF2B5EF4-FFF2-40B4-BE49-F238E27FC236}">
+                <a16:creationId xmlns:a16="http://schemas.microsoft.com/office/drawing/2014/main" id="{99C6E743-F681-451D-971D-CB146486B754}"/>
+              </a:ext>
+            </a:extLst>
+          </p:cNvPr>
+          <p:cNvSpPr/>
+          <p:nvPr/>
+        </p:nvSpPr>
+        <p:spPr>
+          <a:xfrm>
+            <a:off x="7213315" y="4475810"/>
+            <a:ext cx="2969703" cy="880844"/>
+          </a:xfrm>
+          <a:prstGeom prst="roundRect">
+            <a:avLst/>
+          </a:prstGeom>
+          <a:solidFill>
+            <a:schemeClr val="accent4"/>
+          </a:solidFill>
+          <a:ln>
+            <a:solidFill>
+              <a:schemeClr val="accent4"/>
+            </a:solidFill>
+          </a:ln>
+        </p:spPr>
+        <p:style>
+          <a:lnRef idx="2">
+            <a:schemeClr val="accent1">
+              <a:shade val="50000"/>
+            </a:schemeClr>
+          </a:lnRef>
+          <a:fillRef idx="1">
+            <a:schemeClr val="accent1"/>
+          </a:fillRef>
+          <a:effectRef idx="0">
+            <a:schemeClr val="accent1"/>
+          </a:effectRef>
+          <a:fontRef idx="minor">
+            <a:schemeClr val="lt1"/>
+          </a:fontRef>
+        </p:style>
+        <p:txBody>
+          <a:bodyPr rtlCol="0" anchor="ctr"/>
+          <a:lstStyle/>
+          <a:p>
+            <a:pPr algn="just"/>
+            <a:r>
+              <a:rPr lang="it-IT" sz="1600" dirty="0">
+                <a:solidFill>
+                  <a:schemeClr val="tx1"/>
+                </a:solidFill>
+                <a:latin typeface="Avenir Next LT Pro Light" panose="020B0304020202020204" pitchFamily="34" charset="0"/>
+              </a:rPr>
+              <a:t>Se gli argomenti in input sono quattro, al termine della registrazione si associa il Tag.</a:t>
+            </a:r>
           </a:p>
         </p:txBody>
       </p:sp>
@@ -11995,62 +12552,7 @@
                 <a:ea typeface="Times New Roman" panose="02020603050405020304" pitchFamily="18" charset="0"/>
                 <a:cs typeface="Times New Roman" panose="02020603050405020304" pitchFamily="18" charset="0"/>
               </a:rPr>
-              <a:t> </a:t>
-            </a:r>
-            <a:r>
-              <a:rPr lang="it-IT" sz="1200" dirty="0" err="1">
-                <a:solidFill>
-                  <a:srgbClr val="569CD6"/>
-                </a:solidFill>
-                <a:latin typeface="Consolas" panose="020B0609020204030204" pitchFamily="49" charset="0"/>
-                <a:ea typeface="Times New Roman" panose="02020603050405020304" pitchFamily="18" charset="0"/>
-                <a:cs typeface="Times New Roman" panose="02020603050405020304" pitchFamily="18" charset="0"/>
-              </a:rPr>
-              <a:t>implements</a:t>
-            </a:r>
-            <a:r>
-              <a:rPr lang="it-IT" sz="1200" dirty="0">
-                <a:solidFill>
-                  <a:srgbClr val="D4D4D4"/>
-                </a:solidFill>
-                <a:latin typeface="Consolas" panose="020B0609020204030204" pitchFamily="49" charset="0"/>
-                <a:ea typeface="Times New Roman" panose="02020603050405020304" pitchFamily="18" charset="0"/>
-                <a:cs typeface="Times New Roman" panose="02020603050405020304" pitchFamily="18" charset="0"/>
-              </a:rPr>
-              <a:t> </a:t>
-            </a:r>
-            <a:r>
-              <a:rPr lang="it-IT" sz="1200" dirty="0" err="1">
-                <a:solidFill>
-                  <a:srgbClr val="4EC9B0"/>
-                </a:solidFill>
-                <a:latin typeface="Consolas" panose="020B0609020204030204" pitchFamily="49" charset="0"/>
-                <a:ea typeface="Times New Roman" panose="02020603050405020304" pitchFamily="18" charset="0"/>
-                <a:cs typeface="Times New Roman" panose="02020603050405020304" pitchFamily="18" charset="0"/>
-              </a:rPr>
-              <a:t>Serializable</a:t>
-            </a:r>
-            <a:r>
-              <a:rPr lang="it-IT" sz="1200" dirty="0">
-                <a:solidFill>
-                  <a:srgbClr val="4EC9B0"/>
-                </a:solidFill>
-                <a:latin typeface="Consolas" panose="020B0609020204030204" pitchFamily="49" charset="0"/>
-                <a:ea typeface="Times New Roman" panose="02020603050405020304" pitchFamily="18" charset="0"/>
-                <a:cs typeface="Times New Roman" panose="02020603050405020304" pitchFamily="18" charset="0"/>
-              </a:rPr>
-              <a:t> </a:t>
-            </a:r>
-            <a:r>
-              <a:rPr lang="it-IT" sz="1200" dirty="0">
-                <a:solidFill>
-                  <a:srgbClr val="D4D4D4"/>
-                </a:solidFill>
-                <a:latin typeface="Consolas" panose="020B0609020204030204" pitchFamily="49" charset="0"/>
-                <a:ea typeface="Times New Roman" panose="02020603050405020304" pitchFamily="18" charset="0"/>
-                <a:cs typeface="Times New Roman" panose="02020603050405020304" pitchFamily="18" charset="0"/>
-              </a:rPr>
-              <a:t>{</a:t>
+              <a:t> {</a:t>
             </a:r>
             <a:endParaRPr lang="it-IT" sz="1200" dirty="0">
               <a:latin typeface="Consolas" panose="020B0609020204030204" pitchFamily="49" charset="0"/>
@@ -13855,6 +14357,68 @@
               <a:ea typeface="Calibri" panose="020F0502020204030204" pitchFamily="34" charset="0"/>
               <a:cs typeface="Times New Roman" panose="02020603050405020304" pitchFamily="18" charset="0"/>
             </a:endParaRPr>
+          </a:p>
+        </p:txBody>
+      </p:sp>
+      <p:sp>
+        <p:nvSpPr>
+          <p:cNvPr id="6" name="Rettangolo con angoli arrotondati 5">
+            <a:extLst>
+              <a:ext uri="{FF2B5EF4-FFF2-40B4-BE49-F238E27FC236}">
+                <a16:creationId xmlns:a16="http://schemas.microsoft.com/office/drawing/2014/main" id="{4D6511D9-5CE1-4CC2-ACCC-C7CBD690ED6D}"/>
+              </a:ext>
+            </a:extLst>
+          </p:cNvPr>
+          <p:cNvSpPr/>
+          <p:nvPr/>
+        </p:nvSpPr>
+        <p:spPr>
+          <a:xfrm>
+            <a:off x="6013689" y="2869035"/>
+            <a:ext cx="2969703" cy="810790"/>
+          </a:xfrm>
+          <a:prstGeom prst="roundRect">
+            <a:avLst/>
+          </a:prstGeom>
+          <a:solidFill>
+            <a:schemeClr val="accent4"/>
+          </a:solidFill>
+          <a:ln>
+            <a:solidFill>
+              <a:schemeClr val="accent4"/>
+            </a:solidFill>
+          </a:ln>
+        </p:spPr>
+        <p:style>
+          <a:lnRef idx="2">
+            <a:schemeClr val="accent1">
+              <a:shade val="50000"/>
+            </a:schemeClr>
+          </a:lnRef>
+          <a:fillRef idx="1">
+            <a:schemeClr val="accent1"/>
+          </a:fillRef>
+          <a:effectRef idx="0">
+            <a:schemeClr val="accent1"/>
+          </a:effectRef>
+          <a:fontRef idx="minor">
+            <a:schemeClr val="lt1"/>
+          </a:fontRef>
+        </p:style>
+        <p:txBody>
+          <a:bodyPr rtlCol="0" anchor="ctr"/>
+          <a:lstStyle/>
+          <a:p>
+            <a:pPr algn="just"/>
+            <a:r>
+              <a:rPr lang="it-IT" sz="1600" dirty="0">
+                <a:solidFill>
+                  <a:schemeClr val="tx1"/>
+                </a:solidFill>
+                <a:latin typeface="Avenir Next LT Pro Light" panose="020B0304020202020204" pitchFamily="34" charset="0"/>
+              </a:rPr>
+              <a:t>Le stringhe inserite nell’array corrispondono alle località in cui si svolgono i congressi.</a:t>
+            </a:r>
           </a:p>
         </p:txBody>
       </p:sp>

</xml_diff>